<commit_message>
New slides for React Summit
</commit_message>
<xml_diff>
--- a/intro-demo-time.pptx
+++ b/intro-demo-time.pptx
@@ -104,6 +104,11 @@
       </a:defRPr>
     </a:lvl9pPr>
   </p:defaultTextStyle>
+  <p:extLst>
+    <p:ext uri="{EFAFB233-063F-42B5-8137-9DF3F51BA10A}">
+      <p15:sldGuideLst xmlns:p15="http://schemas.microsoft.com/office/powerpoint/2012/main"/>
+    </p:ext>
+  </p:extLst>
 </p:presentation>
 </file>
 
@@ -260,7 +265,7 @@
           <a:p>
             <a:fld id="{C128FA71-3A18-48C0-980F-4B68F7F63042}" type="datetime1">
               <a:rPr lang="en-US" smtClean="0"/>
-              <a:t>3/18/25</a:t>
+              <a:t>5/17/25</a:t>
             </a:fld>
             <a:endParaRPr lang="en-US"/>
           </a:p>
@@ -468,7 +473,7 @@
           <a:p>
             <a:fld id="{7104EDB3-C0E8-45F8-9E1D-1B6C8D1880C0}" type="datetime1">
               <a:rPr lang="en-US" smtClean="0"/>
-              <a:t>3/18/25</a:t>
+              <a:t>5/17/25</a:t>
             </a:fld>
             <a:endParaRPr lang="en-US"/>
           </a:p>
@@ -678,7 +683,7 @@
           <a:p>
             <a:fld id="{9CF0EC4B-54ED-4041-B552-9BA760FA3DBA}" type="datetime1">
               <a:rPr lang="en-US" smtClean="0"/>
-              <a:t>3/18/25</a:t>
+              <a:t>5/17/25</a:t>
             </a:fld>
             <a:endParaRPr lang="en-US"/>
           </a:p>
@@ -876,7 +881,7 @@
           <a:p>
             <a:fld id="{51C1210E-201E-4473-82AC-2466F5386C38}" type="datetime1">
               <a:rPr lang="en-US" smtClean="0"/>
-              <a:t>3/18/25</a:t>
+              <a:t>5/17/25</a:t>
             </a:fld>
             <a:endParaRPr lang="en-US"/>
           </a:p>
@@ -1154,7 +1159,7 @@
           <a:p>
             <a:fld id="{B01EA198-6CAB-4B8F-B93F-1F9C8C4B6CE7}" type="datetime1">
               <a:rPr lang="en-US" smtClean="0"/>
-              <a:t>3/18/25</a:t>
+              <a:t>5/17/25</a:t>
             </a:fld>
             <a:endParaRPr lang="en-US"/>
           </a:p>
@@ -1426,7 +1431,7 @@
           <a:p>
             <a:fld id="{CA06041F-4525-44D5-AA4F-332294BF1F56}" type="datetime1">
               <a:rPr lang="en-US" smtClean="0"/>
-              <a:t>3/18/25</a:t>
+              <a:t>5/17/25</a:t>
             </a:fld>
             <a:endParaRPr lang="en-US"/>
           </a:p>
@@ -1850,7 +1855,7 @@
           <a:p>
             <a:fld id="{F9557091-BBDF-4EB9-BA6B-2BB67AC4FC0F}" type="datetime1">
               <a:rPr lang="en-US" smtClean="0"/>
-              <a:t>3/18/25</a:t>
+              <a:t>5/17/25</a:t>
             </a:fld>
             <a:endParaRPr lang="en-US"/>
           </a:p>
@@ -1991,7 +1996,7 @@
           <a:p>
             <a:fld id="{2D6B226B-77A6-410C-9796-083F278E0125}" type="datetime1">
               <a:rPr lang="en-US" smtClean="0"/>
-              <a:t>3/18/25</a:t>
+              <a:t>5/17/25</a:t>
             </a:fld>
             <a:endParaRPr lang="en-US"/>
           </a:p>
@@ -2104,7 +2109,7 @@
           <a:p>
             <a:fld id="{A23A578B-D289-4C40-8593-3D356C49DA58}" type="datetime1">
               <a:rPr lang="en-US" smtClean="0"/>
-              <a:t>3/18/25</a:t>
+              <a:t>5/17/25</a:t>
             </a:fld>
             <a:endParaRPr lang="en-US"/>
           </a:p>
@@ -2423,7 +2428,7 @@
           <a:p>
             <a:fld id="{713DFAE3-14DB-48A7-A80F-80DDB072CE3D}" type="datetime1">
               <a:rPr lang="en-US" smtClean="0"/>
-              <a:t>3/18/25</a:t>
+              <a:t>5/17/25</a:t>
             </a:fld>
             <a:endParaRPr lang="en-US"/>
           </a:p>
@@ -2717,7 +2722,7 @@
           <a:p>
             <a:fld id="{92C5EAEF-6478-4102-8F5D-A5FE9FC97ACB}" type="datetime1">
               <a:rPr lang="en-US" smtClean="0"/>
-              <a:t>3/18/25</a:t>
+              <a:t>5/17/25</a:t>
             </a:fld>
             <a:endParaRPr lang="en-US"/>
           </a:p>
@@ -2958,7 +2963,7 @@
           <a:p>
             <a:fld id="{67F45AC6-C491-4585-A584-9CE2AF7D5500}" type="datetime1">
               <a:rPr lang="en-US" smtClean="0"/>
-              <a:t>3/18/25</a:t>
+              <a:t>5/17/25</a:t>
             </a:fld>
             <a:endParaRPr lang="en-US"/>
           </a:p>
@@ -3361,7 +3366,9 @@
     <p:bg>
       <p:bgPr>
         <a:solidFill>
-          <a:schemeClr val="bg1"/>
+          <a:schemeClr val="tx1">
+            <a:alpha val="0"/>
+          </a:schemeClr>
         </a:solidFill>
         <a:effectLst/>
       </p:bgPr>
@@ -3477,8 +3484,50 @@
         </p:nvSpPr>
         <p:spPr>
           <a:xfrm>
-            <a:off x="510074" y="1635260"/>
-            <a:ext cx="3348297" cy="2241755"/>
+            <a:off x="2976352" y="1351576"/>
+            <a:ext cx="6239296" cy="4154848"/>
+          </a:xfrm>
+          <a:solidFill>
+            <a:schemeClr val="tx1"/>
+          </a:solidFill>
+        </p:spPr>
+        <p:txBody>
+          <a:bodyPr anchor="ctr">
+            <a:normAutofit/>
+          </a:bodyPr>
+          <a:lstStyle/>
+          <a:p>
+            <a:r>
+              <a:rPr lang="en-US" dirty="0">
+                <a:solidFill>
+                  <a:schemeClr val="bg1"/>
+                </a:solidFill>
+              </a:rPr>
+              <a:t>Improve Your Presentation Skills by Scripting Your Live Coding Demos to Perfection</a:t>
+            </a:r>
+          </a:p>
+        </p:txBody>
+      </p:sp>
+      <p:sp>
+        <p:nvSpPr>
+          <p:cNvPr id="3" name="Subtitle 2">
+            <a:extLst>
+              <a:ext uri="{FF2B5EF4-FFF2-40B4-BE49-F238E27FC236}">
+                <a16:creationId xmlns:a16="http://schemas.microsoft.com/office/drawing/2014/main" id="{0B0690ED-3032-EC74-24AD-CDC5177619D1}"/>
+              </a:ext>
+            </a:extLst>
+          </p:cNvPr>
+          <p:cNvSpPr>
+            <a:spLocks noGrp="1"/>
+          </p:cNvSpPr>
+          <p:nvPr>
+            <p:ph type="subTitle" idx="1"/>
+          </p:nvPr>
+        </p:nvSpPr>
+        <p:spPr>
+          <a:xfrm>
+            <a:off x="2976353" y="5506424"/>
+            <a:ext cx="6239296" cy="416348"/>
           </a:xfrm>
         </p:spPr>
         <p:txBody>
@@ -3490,83 +3539,28 @@
             <a:pPr algn="l"/>
             <a:r>
               <a:rPr lang="en-US" dirty="0"/>
-              <a:t>Introduction to Demo Time</a:t>
-            </a:r>
-          </a:p>
-        </p:txBody>
-      </p:sp>
-      <p:sp>
-        <p:nvSpPr>
-          <p:cNvPr id="3" name="Subtitle 2">
-            <a:extLst>
-              <a:ext uri="{FF2B5EF4-FFF2-40B4-BE49-F238E27FC236}">
-                <a16:creationId xmlns:a16="http://schemas.microsoft.com/office/drawing/2014/main" id="{0B0690ED-3032-EC74-24AD-CDC5177619D1}"/>
-              </a:ext>
-            </a:extLst>
-          </p:cNvPr>
-          <p:cNvSpPr>
-            <a:spLocks noGrp="1"/>
-          </p:cNvSpPr>
-          <p:nvPr>
-            <p:ph type="subTitle" idx="1"/>
-          </p:nvPr>
-        </p:nvSpPr>
-        <p:spPr>
-          <a:xfrm>
-            <a:off x="510074" y="4003563"/>
-            <a:ext cx="3348297" cy="1184584"/>
-          </a:xfrm>
-        </p:spPr>
-        <p:txBody>
-          <a:bodyPr>
-            <a:normAutofit/>
-          </a:bodyPr>
-          <a:lstStyle/>
-          <a:p>
-            <a:pPr algn="l"/>
-            <a:r>
-              <a:rPr lang="en-US"/>
-              <a:t>Elio Struyf</a:t>
-            </a:r>
-          </a:p>
-        </p:txBody>
-      </p:sp>
-      <p:pic>
-        <p:nvPicPr>
-          <p:cNvPr id="10" name="Graphic 9">
-            <a:extLst>
-              <a:ext uri="{FF2B5EF4-FFF2-40B4-BE49-F238E27FC236}">
-                <a16:creationId xmlns:a16="http://schemas.microsoft.com/office/drawing/2014/main" id="{21BFBF8D-E01E-AF49-CBE5-C77AC4924C26}"/>
-              </a:ext>
-            </a:extLst>
-          </p:cNvPr>
-          <p:cNvPicPr>
-            <a:picLocks noChangeAspect="1"/>
-          </p:cNvPicPr>
-          <p:nvPr/>
-        </p:nvPicPr>
-        <p:blipFill>
-          <a:blip r:embed="rId2">
-            <a:extLst>
-              <a:ext uri="{96DAC541-7B7A-43D3-8B79-37D633B846F1}">
-                <asvg:svgBlip xmlns:asvg="http://schemas.microsoft.com/office/drawing/2016/SVG/main" r:embed="rId3"/>
-              </a:ext>
-            </a:extLst>
-          </a:blip>
-          <a:stretch>
-            <a:fillRect/>
-          </a:stretch>
-        </p:blipFill>
-        <p:spPr>
-          <a:xfrm>
-            <a:off x="4783261" y="394504"/>
-            <a:ext cx="6512483" cy="6061934"/>
-          </a:xfrm>
-          <a:prstGeom prst="rect">
-            <a:avLst/>
-          </a:prstGeom>
-        </p:spPr>
-      </p:pic>
+              <a:t>- Elio Struyf 			</a:t>
+            </a:r>
+            <a:r>
+              <a:rPr lang="en-US" sz="1200" dirty="0">
+                <a:solidFill>
+                  <a:schemeClr val="bg1">
+                    <a:lumMod val="50000"/>
+                  </a:schemeClr>
+                </a:solidFill>
+              </a:rPr>
+              <a:t>Microsoft MVP, GitHub Star, GDE</a:t>
+            </a:r>
+            <a:endParaRPr lang="en-US" dirty="0">
+              <a:solidFill>
+                <a:schemeClr val="bg1">
+                  <a:lumMod val="50000"/>
+                </a:schemeClr>
+              </a:solidFill>
+            </a:endParaRPr>
+          </a:p>
+        </p:txBody>
+      </p:sp>
     </p:spTree>
     <p:extLst>
       <p:ext uri="{BB962C8B-B14F-4D97-AF65-F5344CB8AC3E}">

</xml_diff>